<commit_message>
modified slide 2, add set and tuple examples
</commit_message>
<xml_diff>
--- a/slides/BelajarPython_02_List_Loop.pptx
+++ b/slides/BelajarPython_02_List_Loop.pptx
@@ -12,6 +12,10 @@
     <p:sldId id="260" r:id="rId6"/>
     <p:sldId id="261" r:id="rId7"/>
     <p:sldId id="262" r:id="rId8"/>
+    <p:sldId id="263" r:id="rId9"/>
+    <p:sldId id="264" r:id="rId10"/>
+    <p:sldId id="265" r:id="rId11"/>
+    <p:sldId id="266" r:id="rId12"/>
   </p:sldIdLst>
   <p:sldSz cx="12192000" cy="6858000"/>
   <p:notesSz cx="6858000" cy="9144000"/>
@@ -121,13 +125,192 @@
 <file path=ppt/revisionInfo.xml><?xml version="1.0" encoding="utf-8"?>
 <p1510:revInfo xmlns:a="http://schemas.openxmlformats.org/drawingml/2006/main" xmlns:r="http://schemas.openxmlformats.org/officeDocument/2006/relationships" xmlns:p1510="http://schemas.microsoft.com/office/powerpoint/2015/10/main">
   <p1510:revLst>
-    <p1510:client id="{DE8640D2-FAAF-4854-8F47-F2BAD82FC575}" v="1" dt="2023-08-26T14:22:17.577"/>
+    <p1510:client id="{A8ED8186-59D8-47BA-A323-CA00C14650C0}" v="6" dt="2023-09-08T14:22:00.820"/>
   </p1510:revLst>
 </p1510:revInfo>
 </file>
 
 <file path=ppt/changesInfos/changesInfo1.xml><?xml version="1.0" encoding="utf-8"?>
 <pc:chgInfo xmlns:a="http://schemas.openxmlformats.org/drawingml/2006/main" xmlns:r="http://schemas.openxmlformats.org/officeDocument/2006/relationships" xmlns:ac="http://schemas.microsoft.com/office/drawing/2013/main/command" xmlns:pc="http://schemas.microsoft.com/office/powerpoint/2013/main/command">
+  <pc:docChgLst>
+    <pc:chgData name="Mico Siahaan" userId="a87d3b564efc7573" providerId="LiveId" clId="{A8ED8186-59D8-47BA-A323-CA00C14650C0}"/>
+    <pc:docChg chg="custSel addSld modSld">
+      <pc:chgData name="Mico Siahaan" userId="a87d3b564efc7573" providerId="LiveId" clId="{A8ED8186-59D8-47BA-A323-CA00C14650C0}" dt="2023-09-08T14:22:27.709" v="138" actId="26606"/>
+      <pc:docMkLst>
+        <pc:docMk/>
+      </pc:docMkLst>
+      <pc:sldChg chg="modSp mod">
+        <pc:chgData name="Mico Siahaan" userId="a87d3b564efc7573" providerId="LiveId" clId="{A8ED8186-59D8-47BA-A323-CA00C14650C0}" dt="2023-09-08T13:52:40.111" v="4" actId="20577"/>
+        <pc:sldMkLst>
+          <pc:docMk/>
+          <pc:sldMk cId="2105632362" sldId="260"/>
+        </pc:sldMkLst>
+        <pc:spChg chg="mod">
+          <ac:chgData name="Mico Siahaan" userId="a87d3b564efc7573" providerId="LiveId" clId="{A8ED8186-59D8-47BA-A323-CA00C14650C0}" dt="2023-09-08T13:52:40.111" v="4" actId="20577"/>
+          <ac:spMkLst>
+            <pc:docMk/>
+            <pc:sldMk cId="2105632362" sldId="260"/>
+            <ac:spMk id="2" creationId="{930D5E87-FD79-E62C-F996-98C0FFA77924}"/>
+          </ac:spMkLst>
+        </pc:spChg>
+      </pc:sldChg>
+      <pc:sldChg chg="modSp mod">
+        <pc:chgData name="Mico Siahaan" userId="a87d3b564efc7573" providerId="LiveId" clId="{A8ED8186-59D8-47BA-A323-CA00C14650C0}" dt="2023-09-08T13:55:26.025" v="8" actId="20577"/>
+        <pc:sldMkLst>
+          <pc:docMk/>
+          <pc:sldMk cId="2357789010" sldId="261"/>
+        </pc:sldMkLst>
+        <pc:spChg chg="mod">
+          <ac:chgData name="Mico Siahaan" userId="a87d3b564efc7573" providerId="LiveId" clId="{A8ED8186-59D8-47BA-A323-CA00C14650C0}" dt="2023-09-08T13:55:26.025" v="8" actId="20577"/>
+          <ac:spMkLst>
+            <pc:docMk/>
+            <pc:sldMk cId="2357789010" sldId="261"/>
+            <ac:spMk id="3" creationId="{A8718158-2667-A81F-549B-B735DEE53160}"/>
+          </ac:spMkLst>
+        </pc:spChg>
+      </pc:sldChg>
+      <pc:sldChg chg="modSp mod">
+        <pc:chgData name="Mico Siahaan" userId="a87d3b564efc7573" providerId="LiveId" clId="{A8ED8186-59D8-47BA-A323-CA00C14650C0}" dt="2023-09-08T13:56:03.121" v="13" actId="20577"/>
+        <pc:sldMkLst>
+          <pc:docMk/>
+          <pc:sldMk cId="3068336530" sldId="263"/>
+        </pc:sldMkLst>
+        <pc:spChg chg="mod">
+          <ac:chgData name="Mico Siahaan" userId="a87d3b564efc7573" providerId="LiveId" clId="{A8ED8186-59D8-47BA-A323-CA00C14650C0}" dt="2023-09-08T13:56:03.121" v="13" actId="20577"/>
+          <ac:spMkLst>
+            <pc:docMk/>
+            <pc:sldMk cId="3068336530" sldId="263"/>
+            <ac:spMk id="5" creationId="{BC61FB80-C64C-9BEA-9F4F-4D99916C5A71}"/>
+          </ac:spMkLst>
+        </pc:spChg>
+      </pc:sldChg>
+      <pc:sldChg chg="addSp delSp modSp mod setBg">
+        <pc:chgData name="Mico Siahaan" userId="a87d3b564efc7573" providerId="LiveId" clId="{A8ED8186-59D8-47BA-A323-CA00C14650C0}" dt="2023-09-08T14:10:47.097" v="58" actId="26606"/>
+        <pc:sldMkLst>
+          <pc:docMk/>
+          <pc:sldMk cId="2005859422" sldId="264"/>
+        </pc:sldMkLst>
+        <pc:spChg chg="add del mod">
+          <ac:chgData name="Mico Siahaan" userId="a87d3b564efc7573" providerId="LiveId" clId="{A8ED8186-59D8-47BA-A323-CA00C14650C0}" dt="2023-09-08T14:10:09.549" v="40" actId="22"/>
+          <ac:spMkLst>
+            <pc:docMk/>
+            <pc:sldMk cId="2005859422" sldId="264"/>
+            <ac:spMk id="3" creationId="{6602E790-EF7A-B015-0480-B72CE9308378}"/>
+          </ac:spMkLst>
+        </pc:spChg>
+        <pc:spChg chg="mod">
+          <ac:chgData name="Mico Siahaan" userId="a87d3b564efc7573" providerId="LiveId" clId="{A8ED8186-59D8-47BA-A323-CA00C14650C0}" dt="2023-09-08T14:10:47.097" v="58" actId="26606"/>
+          <ac:spMkLst>
+            <pc:docMk/>
+            <pc:sldMk cId="2005859422" sldId="264"/>
+            <ac:spMk id="4" creationId="{BFA33DDE-F022-EAB0-D158-05DB8CDCB8B8}"/>
+          </ac:spMkLst>
+        </pc:spChg>
+        <pc:spChg chg="mod">
+          <ac:chgData name="Mico Siahaan" userId="a87d3b564efc7573" providerId="LiveId" clId="{A8ED8186-59D8-47BA-A323-CA00C14650C0}" dt="2023-09-08T14:10:47.097" v="58" actId="26606"/>
+          <ac:spMkLst>
+            <pc:docMk/>
+            <pc:sldMk cId="2005859422" sldId="264"/>
+            <ac:spMk id="5" creationId="{AF870020-EF77-6DF6-FDE1-0879A3C04EA2}"/>
+          </ac:spMkLst>
+        </pc:spChg>
+        <pc:picChg chg="add mod ord">
+          <ac:chgData name="Mico Siahaan" userId="a87d3b564efc7573" providerId="LiveId" clId="{A8ED8186-59D8-47BA-A323-CA00C14650C0}" dt="2023-09-08T14:10:47.097" v="58" actId="26606"/>
+          <ac:picMkLst>
+            <pc:docMk/>
+            <pc:sldMk cId="2005859422" sldId="264"/>
+            <ac:picMk id="7" creationId="{EDFE5F3F-15E3-BCC0-C327-AC4C1A19C340}"/>
+          </ac:picMkLst>
+        </pc:picChg>
+        <pc:picChg chg="del">
+          <ac:chgData name="Mico Siahaan" userId="a87d3b564efc7573" providerId="LiveId" clId="{A8ED8186-59D8-47BA-A323-CA00C14650C0}" dt="2023-09-08T13:56:40.689" v="39" actId="478"/>
+          <ac:picMkLst>
+            <pc:docMk/>
+            <pc:sldMk cId="2005859422" sldId="264"/>
+            <ac:picMk id="8" creationId="{727C981D-0055-FBD7-5D8D-E83016A70F90}"/>
+          </ac:picMkLst>
+        </pc:picChg>
+        <pc:picChg chg="add mod">
+          <ac:chgData name="Mico Siahaan" userId="a87d3b564efc7573" providerId="LiveId" clId="{A8ED8186-59D8-47BA-A323-CA00C14650C0}" dt="2023-09-08T14:10:47.097" v="58" actId="26606"/>
+          <ac:picMkLst>
+            <pc:docMk/>
+            <pc:sldMk cId="2005859422" sldId="264"/>
+            <ac:picMk id="10" creationId="{A5F9C671-A575-8BFA-963D-F5D54FB8309B}"/>
+          </ac:picMkLst>
+        </pc:picChg>
+      </pc:sldChg>
+      <pc:sldChg chg="modSp add mod">
+        <pc:chgData name="Mico Siahaan" userId="a87d3b564efc7573" providerId="LiveId" clId="{A8ED8186-59D8-47BA-A323-CA00C14650C0}" dt="2023-09-08T14:12:00.473" v="62" actId="20577"/>
+        <pc:sldMkLst>
+          <pc:docMk/>
+          <pc:sldMk cId="3227882625" sldId="265"/>
+        </pc:sldMkLst>
+        <pc:spChg chg="mod">
+          <ac:chgData name="Mico Siahaan" userId="a87d3b564efc7573" providerId="LiveId" clId="{A8ED8186-59D8-47BA-A323-CA00C14650C0}" dt="2023-09-08T14:12:00.473" v="62" actId="20577"/>
+          <ac:spMkLst>
+            <pc:docMk/>
+            <pc:sldMk cId="3227882625" sldId="265"/>
+            <ac:spMk id="5" creationId="{BC61FB80-C64C-9BEA-9F4F-4D99916C5A71}"/>
+          </ac:spMkLst>
+        </pc:spChg>
+      </pc:sldChg>
+      <pc:sldChg chg="addSp delSp modSp mod setBg">
+        <pc:chgData name="Mico Siahaan" userId="a87d3b564efc7573" providerId="LiveId" clId="{A8ED8186-59D8-47BA-A323-CA00C14650C0}" dt="2023-09-08T14:22:27.709" v="138" actId="26606"/>
+        <pc:sldMkLst>
+          <pc:docMk/>
+          <pc:sldMk cId="1177734226" sldId="266"/>
+        </pc:sldMkLst>
+        <pc:spChg chg="mod">
+          <ac:chgData name="Mico Siahaan" userId="a87d3b564efc7573" providerId="LiveId" clId="{A8ED8186-59D8-47BA-A323-CA00C14650C0}" dt="2023-09-08T14:21:01.074" v="65" actId="20577"/>
+          <ac:spMkLst>
+            <pc:docMk/>
+            <pc:sldMk cId="1177734226" sldId="266"/>
+            <ac:spMk id="4" creationId="{BFA33DDE-F022-EAB0-D158-05DB8CDCB8B8}"/>
+          </ac:spMkLst>
+        </pc:spChg>
+        <pc:spChg chg="mod">
+          <ac:chgData name="Mico Siahaan" userId="a87d3b564efc7573" providerId="LiveId" clId="{A8ED8186-59D8-47BA-A323-CA00C14650C0}" dt="2023-09-08T14:22:27.709" v="138" actId="26606"/>
+          <ac:spMkLst>
+            <pc:docMk/>
+            <pc:sldMk cId="1177734226" sldId="266"/>
+            <ac:spMk id="5" creationId="{AF870020-EF77-6DF6-FDE1-0879A3C04EA2}"/>
+          </ac:spMkLst>
+        </pc:spChg>
+        <pc:picChg chg="add del mod">
+          <ac:chgData name="Mico Siahaan" userId="a87d3b564efc7573" providerId="LiveId" clId="{A8ED8186-59D8-47BA-A323-CA00C14650C0}" dt="2023-09-08T14:22:05.338" v="132" actId="478"/>
+          <ac:picMkLst>
+            <pc:docMk/>
+            <pc:sldMk cId="1177734226" sldId="266"/>
+            <ac:picMk id="2" creationId="{4403D7CC-DE4E-6850-8541-097C17F2996F}"/>
+          </ac:picMkLst>
+        </pc:picChg>
+        <pc:picChg chg="add mod">
+          <ac:chgData name="Mico Siahaan" userId="a87d3b564efc7573" providerId="LiveId" clId="{A8ED8186-59D8-47BA-A323-CA00C14650C0}" dt="2023-09-08T14:22:27.709" v="138" actId="26606"/>
+          <ac:picMkLst>
+            <pc:docMk/>
+            <pc:sldMk cId="1177734226" sldId="266"/>
+            <ac:picMk id="6" creationId="{8856CF61-66DE-D642-D72C-EAEDBBF35618}"/>
+          </ac:picMkLst>
+        </pc:picChg>
+        <pc:picChg chg="ord">
+          <ac:chgData name="Mico Siahaan" userId="a87d3b564efc7573" providerId="LiveId" clId="{A8ED8186-59D8-47BA-A323-CA00C14650C0}" dt="2023-09-08T14:22:27.709" v="138" actId="26606"/>
+          <ac:picMkLst>
+            <pc:docMk/>
+            <pc:sldMk cId="1177734226" sldId="266"/>
+            <ac:picMk id="7" creationId="{EDFE5F3F-15E3-BCC0-C327-AC4C1A19C340}"/>
+          </ac:picMkLst>
+        </pc:picChg>
+        <pc:picChg chg="del">
+          <ac:chgData name="Mico Siahaan" userId="a87d3b564efc7573" providerId="LiveId" clId="{A8ED8186-59D8-47BA-A323-CA00C14650C0}" dt="2023-09-08T14:21:55.529" v="129" actId="478"/>
+          <ac:picMkLst>
+            <pc:docMk/>
+            <pc:sldMk cId="1177734226" sldId="266"/>
+            <ac:picMk id="10" creationId="{A5F9C671-A575-8BFA-963D-F5D54FB8309B}"/>
+          </ac:picMkLst>
+        </pc:picChg>
+      </pc:sldChg>
+    </pc:docChg>
+  </pc:docChgLst>
   <pc:docChgLst>
     <pc:chgData name="Mico Siahaan" userId="a87d3b564efc7573" providerId="Windows Live" clId="Web-{DE8640D2-FAAF-4854-8F47-F2BAD82FC575}"/>
     <pc:docChg chg="modSld addMainMaster delMainMaster">
@@ -799,7 +982,7 @@
             <a:fld id="{B61BEF0D-F0BB-DE4B-95CE-6DB70DBA9567}" type="datetimeFigureOut">
               <a:rPr lang="en-US" dirty="0"/>
               <a:pPr/>
-              <a:t>8/26/2023</a:t>
+              <a:t>9/8/2023</a:t>
             </a:fld>
             <a:endParaRPr lang="en-US" dirty="0"/>
           </a:p>
@@ -1087,7 +1270,7 @@
             <a:fld id="{B61BEF0D-F0BB-DE4B-95CE-6DB70DBA9567}" type="datetimeFigureOut">
               <a:rPr lang="en-US" dirty="0"/>
               <a:pPr/>
-              <a:t>8/26/2023</a:t>
+              <a:t>9/8/2023</a:t>
             </a:fld>
             <a:endParaRPr lang="en-US" dirty="0"/>
           </a:p>
@@ -1347,7 +1530,7 @@
             <a:fld id="{B61BEF0D-F0BB-DE4B-95CE-6DB70DBA9567}" type="datetimeFigureOut">
               <a:rPr lang="en-US" dirty="0"/>
               <a:pPr/>
-              <a:t>8/26/2023</a:t>
+              <a:t>9/8/2023</a:t>
             </a:fld>
             <a:endParaRPr lang="en-US" dirty="0"/>
           </a:p>
@@ -1817,7 +2000,7 @@
             <a:fld id="{B61BEF0D-F0BB-DE4B-95CE-6DB70DBA9567}" type="datetimeFigureOut">
               <a:rPr lang="en-US" dirty="0"/>
               <a:pPr/>
-              <a:t>8/26/2023</a:t>
+              <a:t>9/8/2023</a:t>
             </a:fld>
             <a:endParaRPr lang="en-US" dirty="0"/>
           </a:p>
@@ -1998,7 +2181,7 @@
             <a:fld id="{B61BEF0D-F0BB-DE4B-95CE-6DB70DBA9567}" type="datetimeFigureOut">
               <a:rPr lang="en-US" dirty="0"/>
               <a:pPr/>
-              <a:t>8/26/2023</a:t>
+              <a:t>9/8/2023</a:t>
             </a:fld>
             <a:endParaRPr lang="en-US" dirty="0"/>
           </a:p>
@@ -2575,7 +2758,7 @@
             <a:fld id="{B61BEF0D-F0BB-DE4B-95CE-6DB70DBA9567}" type="datetimeFigureOut">
               <a:rPr lang="en-US" dirty="0"/>
               <a:pPr/>
-              <a:t>8/26/2023</a:t>
+              <a:t>9/8/2023</a:t>
             </a:fld>
             <a:endParaRPr lang="en-US" dirty="0"/>
           </a:p>
@@ -2908,7 +3091,7 @@
             <a:fld id="{B61BEF0D-F0BB-DE4B-95CE-6DB70DBA9567}" type="datetimeFigureOut">
               <a:rPr lang="en-US" dirty="0"/>
               <a:pPr/>
-              <a:t>8/26/2023</a:t>
+              <a:t>9/8/2023</a:t>
             </a:fld>
             <a:endParaRPr lang="en-US" dirty="0"/>
           </a:p>
@@ -3083,7 +3266,7 @@
             <a:fld id="{B61BEF0D-F0BB-DE4B-95CE-6DB70DBA9567}" type="datetimeFigureOut">
               <a:rPr lang="en-US" dirty="0"/>
               <a:pPr/>
-              <a:t>8/26/2023</a:t>
+              <a:t>9/8/2023</a:t>
             </a:fld>
             <a:endParaRPr lang="en-US" dirty="0"/>
           </a:p>
@@ -3263,7 +3446,7 @@
             <a:fld id="{B61BEF0D-F0BB-DE4B-95CE-6DB70DBA9567}" type="datetimeFigureOut">
               <a:rPr lang="en-US" dirty="0"/>
               <a:pPr/>
-              <a:t>8/26/2023</a:t>
+              <a:t>9/8/2023</a:t>
             </a:fld>
             <a:endParaRPr lang="en-US" dirty="0"/>
           </a:p>
@@ -3433,7 +3616,7 @@
             <a:fld id="{B61BEF0D-F0BB-DE4B-95CE-6DB70DBA9567}" type="datetimeFigureOut">
               <a:rPr lang="en-US" dirty="0"/>
               <a:pPr/>
-              <a:t>8/26/2023</a:t>
+              <a:t>9/8/2023</a:t>
             </a:fld>
             <a:endParaRPr lang="en-US" dirty="0"/>
           </a:p>
@@ -3691,7 +3874,7 @@
             <a:fld id="{B61BEF0D-F0BB-DE4B-95CE-6DB70DBA9567}" type="datetimeFigureOut">
               <a:rPr lang="en-US" dirty="0"/>
               <a:pPr/>
-              <a:t>8/26/2023</a:t>
+              <a:t>9/8/2023</a:t>
             </a:fld>
             <a:endParaRPr lang="en-US" dirty="0"/>
           </a:p>
@@ -3982,7 +4165,7 @@
             <a:fld id="{B61BEF0D-F0BB-DE4B-95CE-6DB70DBA9567}" type="datetimeFigureOut">
               <a:rPr lang="en-US" dirty="0"/>
               <a:pPr/>
-              <a:t>8/26/2023</a:t>
+              <a:t>9/8/2023</a:t>
             </a:fld>
             <a:endParaRPr lang="en-US" dirty="0"/>
           </a:p>
@@ -4411,7 +4594,7 @@
             <a:fld id="{B61BEF0D-F0BB-DE4B-95CE-6DB70DBA9567}" type="datetimeFigureOut">
               <a:rPr lang="en-US" dirty="0"/>
               <a:pPr/>
-              <a:t>8/26/2023</a:t>
+              <a:t>9/8/2023</a:t>
             </a:fld>
             <a:endParaRPr lang="en-US" dirty="0"/>
           </a:p>
@@ -4530,7 +4713,7 @@
             <a:fld id="{B61BEF0D-F0BB-DE4B-95CE-6DB70DBA9567}" type="datetimeFigureOut">
               <a:rPr lang="en-US" dirty="0"/>
               <a:pPr/>
-              <a:t>8/26/2023</a:t>
+              <a:t>9/8/2023</a:t>
             </a:fld>
             <a:endParaRPr lang="en-US" dirty="0"/>
           </a:p>
@@ -4627,7 +4810,7 @@
             <a:fld id="{B61BEF0D-F0BB-DE4B-95CE-6DB70DBA9567}" type="datetimeFigureOut">
               <a:rPr lang="en-US" dirty="0"/>
               <a:pPr/>
-              <a:t>8/26/2023</a:t>
+              <a:t>9/8/2023</a:t>
             </a:fld>
             <a:endParaRPr lang="en-US" dirty="0"/>
           </a:p>
@@ -4910,7 +5093,7 @@
             <a:fld id="{B61BEF0D-F0BB-DE4B-95CE-6DB70DBA9567}" type="datetimeFigureOut">
               <a:rPr lang="en-US" dirty="0"/>
               <a:pPr/>
-              <a:t>8/26/2023</a:t>
+              <a:t>9/8/2023</a:t>
             </a:fld>
             <a:endParaRPr lang="en-US" dirty="0"/>
           </a:p>
@@ -5198,7 +5381,7 @@
             <a:fld id="{B61BEF0D-F0BB-DE4B-95CE-6DB70DBA9567}" type="datetimeFigureOut">
               <a:rPr lang="en-US" dirty="0"/>
               <a:pPr/>
-              <a:t>8/26/2023</a:t>
+              <a:t>9/8/2023</a:t>
             </a:fld>
             <a:endParaRPr lang="en-US" dirty="0"/>
           </a:p>
@@ -5457,7 +5640,7 @@
             <a:fld id="{B61BEF0D-F0BB-DE4B-95CE-6DB70DBA9567}" type="datetimeFigureOut">
               <a:rPr lang="en-US" dirty="0"/>
               <a:pPr/>
-              <a:t>8/26/2023</a:t>
+              <a:t>9/8/2023</a:t>
             </a:fld>
             <a:endParaRPr lang="en-US" dirty="0"/>
           </a:p>
@@ -6950,6 +7133,351 @@
 </p:sld>
 </file>
 
+<file path=ppt/slides/slide10.xml><?xml version="1.0" encoding="utf-8"?>
+<p:sld xmlns:a="http://schemas.openxmlformats.org/drawingml/2006/main" xmlns:r="http://schemas.openxmlformats.org/officeDocument/2006/relationships" xmlns:p="http://schemas.openxmlformats.org/presentationml/2006/main">
+  <p:cSld>
+    <p:spTree>
+      <p:nvGrpSpPr>
+        <p:cNvPr id="1" name=""/>
+        <p:cNvGrpSpPr/>
+        <p:nvPr/>
+      </p:nvGrpSpPr>
+      <p:grpSpPr>
+        <a:xfrm>
+          <a:off x="0" y="0"/>
+          <a:ext cx="0" cy="0"/>
+          <a:chOff x="0" y="0"/>
+          <a:chExt cx="0" cy="0"/>
+        </a:xfrm>
+      </p:grpSpPr>
+      <p:sp>
+        <p:nvSpPr>
+          <p:cNvPr id="4" name="Title 3">
+            <a:extLst>
+              <a:ext uri="{FF2B5EF4-FFF2-40B4-BE49-F238E27FC236}">
+                <a16:creationId xmlns:a16="http://schemas.microsoft.com/office/drawing/2014/main" id="{AE75D4F9-9295-84C3-BC26-7366432BADCA}"/>
+              </a:ext>
+            </a:extLst>
+          </p:cNvPr>
+          <p:cNvSpPr>
+            <a:spLocks noGrp="1"/>
+          </p:cNvSpPr>
+          <p:nvPr>
+            <p:ph type="title"/>
+          </p:nvPr>
+        </p:nvSpPr>
+        <p:spPr/>
+        <p:txBody>
+          <a:bodyPr/>
+          <a:lstStyle/>
+          <a:p>
+            <a:r>
+              <a:rPr lang="en-US" dirty="0"/>
+              <a:t>Collection</a:t>
+            </a:r>
+            <a:endParaRPr lang="en-MY" dirty="0"/>
+          </a:p>
+        </p:txBody>
+      </p:sp>
+      <p:sp>
+        <p:nvSpPr>
+          <p:cNvPr id="5" name="Text Placeholder 4">
+            <a:extLst>
+              <a:ext uri="{FF2B5EF4-FFF2-40B4-BE49-F238E27FC236}">
+                <a16:creationId xmlns:a16="http://schemas.microsoft.com/office/drawing/2014/main" id="{BC61FB80-C64C-9BEA-9F4F-4D99916C5A71}"/>
+              </a:ext>
+            </a:extLst>
+          </p:cNvPr>
+          <p:cNvSpPr>
+            <a:spLocks noGrp="1"/>
+          </p:cNvSpPr>
+          <p:nvPr>
+            <p:ph type="body" idx="1"/>
+          </p:nvPr>
+        </p:nvSpPr>
+        <p:spPr/>
+        <p:txBody>
+          <a:bodyPr/>
+          <a:lstStyle/>
+          <a:p>
+            <a:r>
+              <a:rPr lang="en-US" dirty="0"/>
+              <a:t>SET</a:t>
+            </a:r>
+            <a:endParaRPr lang="en-MY" dirty="0"/>
+          </a:p>
+        </p:txBody>
+      </p:sp>
+    </p:spTree>
+    <p:extLst>
+      <p:ext uri="{BB962C8B-B14F-4D97-AF65-F5344CB8AC3E}">
+        <p14:creationId xmlns:p14="http://schemas.microsoft.com/office/powerpoint/2010/main" val="3227882625"/>
+      </p:ext>
+    </p:extLst>
+  </p:cSld>
+  <p:clrMapOvr>
+    <a:masterClrMapping/>
+  </p:clrMapOvr>
+</p:sld>
+</file>
+
+<file path=ppt/slides/slide11.xml><?xml version="1.0" encoding="utf-8"?>
+<p:sld xmlns:a="http://schemas.openxmlformats.org/drawingml/2006/main" xmlns:r="http://schemas.openxmlformats.org/officeDocument/2006/relationships" xmlns:p="http://schemas.openxmlformats.org/presentationml/2006/main">
+  <p:cSld>
+    <p:bg>
+      <p:bgPr>
+        <a:blipFill rotWithShape="1">
+          <a:blip r:embed="rId2">
+            <a:duotone>
+              <a:schemeClr val="bg2">
+                <a:shade val="28000"/>
+                <a:satMod val="94000"/>
+                <a:lumMod val="20000"/>
+              </a:schemeClr>
+              <a:schemeClr val="bg2">
+                <a:tint val="94000"/>
+                <a:shade val="84000"/>
+                <a:satMod val="148000"/>
+                <a:lumMod val="114000"/>
+              </a:schemeClr>
+            </a:duotone>
+          </a:blip>
+          <a:stretch/>
+        </a:blipFill>
+        <a:effectLst/>
+      </p:bgPr>
+    </p:bg>
+    <p:spTree>
+      <p:nvGrpSpPr>
+        <p:cNvPr id="1" name=""/>
+        <p:cNvGrpSpPr/>
+        <p:nvPr/>
+      </p:nvGrpSpPr>
+      <p:grpSpPr>
+        <a:xfrm>
+          <a:off x="0" y="0"/>
+          <a:ext cx="0" cy="0"/>
+          <a:chOff x="0" y="0"/>
+          <a:chExt cx="0" cy="0"/>
+        </a:xfrm>
+      </p:grpSpPr>
+      <p:sp>
+        <p:nvSpPr>
+          <p:cNvPr id="4" name="Title 3">
+            <a:extLst>
+              <a:ext uri="{FF2B5EF4-FFF2-40B4-BE49-F238E27FC236}">
+                <a16:creationId xmlns:a16="http://schemas.microsoft.com/office/drawing/2014/main" id="{BFA33DDE-F022-EAB0-D158-05DB8CDCB8B8}"/>
+              </a:ext>
+            </a:extLst>
+          </p:cNvPr>
+          <p:cNvSpPr>
+            <a:spLocks noGrp="1"/>
+          </p:cNvSpPr>
+          <p:nvPr>
+            <p:ph type="title"/>
+          </p:nvPr>
+        </p:nvSpPr>
+        <p:spPr>
+          <a:xfrm>
+            <a:off x="643192" y="609600"/>
+            <a:ext cx="3643674" cy="1905000"/>
+          </a:xfrm>
+        </p:spPr>
+        <p:txBody>
+          <a:bodyPr vert="horz" lIns="91440" tIns="45720" rIns="91440" bIns="45720" rtlCol="0" anchor="ctr">
+            <a:normAutofit/>
+          </a:bodyPr>
+          <a:lstStyle/>
+          <a:p>
+            <a:r>
+              <a:rPr lang="en-US" sz="2800" dirty="0"/>
+              <a:t>SET</a:t>
+            </a:r>
+          </a:p>
+        </p:txBody>
+      </p:sp>
+      <p:sp>
+        <p:nvSpPr>
+          <p:cNvPr id="5" name="Content Placeholder 4">
+            <a:extLst>
+              <a:ext uri="{FF2B5EF4-FFF2-40B4-BE49-F238E27FC236}">
+                <a16:creationId xmlns:a16="http://schemas.microsoft.com/office/drawing/2014/main" id="{AF870020-EF77-6DF6-FDE1-0879A3C04EA2}"/>
+              </a:ext>
+            </a:extLst>
+          </p:cNvPr>
+          <p:cNvSpPr>
+            <a:spLocks noGrp="1"/>
+          </p:cNvSpPr>
+          <p:nvPr>
+            <p:ph sz="half" idx="1"/>
+          </p:nvPr>
+        </p:nvSpPr>
+        <p:spPr>
+          <a:xfrm>
+            <a:off x="643192" y="2666999"/>
+            <a:ext cx="3643674" cy="3216276"/>
+          </a:xfrm>
+        </p:spPr>
+        <p:txBody>
+          <a:bodyPr vert="horz" lIns="91440" tIns="45720" rIns="91440" bIns="45720" rtlCol="0" anchor="t">
+            <a:normAutofit/>
+          </a:bodyPr>
+          <a:lstStyle/>
+          <a:p>
+            <a:r>
+              <a:rPr lang="en-US" dirty="0"/>
+              <a:t>Collections</a:t>
+            </a:r>
+          </a:p>
+          <a:p>
+            <a:r>
+              <a:rPr lang="en-US"/>
+              <a:t>Dapat</a:t>
+            </a:r>
+            <a:r>
+              <a:rPr lang="en-US" dirty="0"/>
+              <a:t> </a:t>
+            </a:r>
+            <a:r>
+              <a:rPr lang="en-US"/>
+              <a:t>memuat</a:t>
+            </a:r>
+            <a:r>
+              <a:rPr lang="en-US" dirty="0"/>
+              <a:t> </a:t>
+            </a:r>
+            <a:r>
+              <a:rPr lang="en-US"/>
+              <a:t>tipe</a:t>
+            </a:r>
+            <a:r>
+              <a:rPr lang="en-US" dirty="0"/>
+              <a:t> data lain: string, </a:t>
+            </a:r>
+            <a:r>
+              <a:rPr lang="en-US"/>
+              <a:t>bilangan</a:t>
+            </a:r>
+            <a:endParaRPr lang="en-US" dirty="0"/>
+          </a:p>
+          <a:p>
+            <a:r>
+              <a:rPr lang="en-US" dirty="0"/>
+              <a:t>Member </a:t>
+            </a:r>
+            <a:r>
+              <a:rPr lang="en-US"/>
+              <a:t>adalah</a:t>
+            </a:r>
+            <a:r>
+              <a:rPr lang="en-US" dirty="0"/>
+              <a:t> </a:t>
+            </a:r>
+            <a:r>
+              <a:rPr lang="en-US"/>
+              <a:t>unik</a:t>
+            </a:r>
+            <a:endParaRPr lang="en-US" dirty="0"/>
+          </a:p>
+        </p:txBody>
+      </p:sp>
+      <p:pic>
+        <p:nvPicPr>
+          <p:cNvPr id="6" name="Picture 5">
+            <a:extLst>
+              <a:ext uri="{FF2B5EF4-FFF2-40B4-BE49-F238E27FC236}">
+                <a16:creationId xmlns:a16="http://schemas.microsoft.com/office/drawing/2014/main" id="{8856CF61-66DE-D642-D72C-EAEDBBF35618}"/>
+              </a:ext>
+            </a:extLst>
+          </p:cNvPr>
+          <p:cNvPicPr>
+            <a:picLocks noChangeAspect="1"/>
+          </p:cNvPicPr>
+          <p:nvPr/>
+        </p:nvPicPr>
+        <p:blipFill>
+          <a:blip r:embed="rId3"/>
+          <a:stretch>
+            <a:fillRect/>
+          </a:stretch>
+        </p:blipFill>
+        <p:spPr>
+          <a:xfrm>
+            <a:off x="4630994" y="1449915"/>
+            <a:ext cx="6916633" cy="3638129"/>
+          </a:xfrm>
+          <a:prstGeom prst="roundRect">
+            <a:avLst>
+              <a:gd name="adj" fmla="val 3517"/>
+            </a:avLst>
+          </a:prstGeom>
+          <a:ln w="38100">
+            <a:gradFill flip="none" rotWithShape="1">
+              <a:gsLst>
+                <a:gs pos="0">
+                  <a:srgbClr val="363D46"/>
+                </a:gs>
+                <a:gs pos="100000">
+                  <a:srgbClr val="363D46">
+                    <a:lumMod val="75000"/>
+                  </a:srgbClr>
+                </a:gs>
+              </a:gsLst>
+              <a:lin ang="5400000" scaled="0"/>
+              <a:tileRect/>
+            </a:gradFill>
+          </a:ln>
+          <a:effectLst>
+            <a:innerShdw blurRad="57150" dist="38100" dir="14460000">
+              <a:srgbClr val="000000">
+                <a:alpha val="70000"/>
+              </a:srgbClr>
+            </a:innerShdw>
+          </a:effectLst>
+        </p:spPr>
+      </p:pic>
+      <p:pic>
+        <p:nvPicPr>
+          <p:cNvPr id="7" name="Content Placeholder 6">
+            <a:extLst>
+              <a:ext uri="{FF2B5EF4-FFF2-40B4-BE49-F238E27FC236}">
+                <a16:creationId xmlns:a16="http://schemas.microsoft.com/office/drawing/2014/main" id="{EDFE5F3F-15E3-BCC0-C327-AC4C1A19C340}"/>
+              </a:ext>
+            </a:extLst>
+          </p:cNvPr>
+          <p:cNvPicPr>
+            <a:picLocks noGrp="1" noChangeAspect="1"/>
+          </p:cNvPicPr>
+          <p:nvPr>
+            <p:ph sz="half" idx="2"/>
+          </p:nvPr>
+        </p:nvPicPr>
+        <p:blipFill>
+          <a:blip r:embed="rId4"/>
+          <a:stretch>
+            <a:fillRect/>
+          </a:stretch>
+        </p:blipFill>
+        <p:spPr>
+          <a:xfrm>
+            <a:off x="8608990" y="4229085"/>
+            <a:ext cx="46" cy="30"/>
+          </a:xfrm>
+        </p:spPr>
+      </p:pic>
+    </p:spTree>
+    <p:extLst>
+      <p:ext uri="{BB962C8B-B14F-4D97-AF65-F5344CB8AC3E}">
+        <p14:creationId xmlns:p14="http://schemas.microsoft.com/office/powerpoint/2010/main" val="1177734226"/>
+      </p:ext>
+    </p:extLst>
+  </p:cSld>
+  <p:clrMapOvr>
+    <a:masterClrMapping/>
+  </p:clrMapOvr>
+</p:sld>
+</file>
+
 <file path=ppt/slides/slide2.xml><?xml version="1.0" encoding="utf-8"?>
 <p:sld xmlns:a="http://schemas.openxmlformats.org/drawingml/2006/main" xmlns:r="http://schemas.openxmlformats.org/officeDocument/2006/relationships" xmlns:p="http://schemas.openxmlformats.org/presentationml/2006/main">
   <p:cSld>
@@ -7646,7 +8174,7 @@
             </a:r>
             <a:r>
               <a:rPr lang="en-US" dirty="0" err="1"/>
-              <a:t>bawaan</a:t>
+              <a:t>Bawaan</a:t>
             </a:r>
             <a:r>
               <a:rPr lang="en-US" dirty="0"/>
@@ -7876,6 +8404,349 @@
     <p:extLst>
       <p:ext uri="{BB962C8B-B14F-4D97-AF65-F5344CB8AC3E}">
         <p14:creationId xmlns:p14="http://schemas.microsoft.com/office/powerpoint/2010/main" val="3552612318"/>
+      </p:ext>
+    </p:extLst>
+  </p:cSld>
+  <p:clrMapOvr>
+    <a:masterClrMapping/>
+  </p:clrMapOvr>
+</p:sld>
+</file>
+
+<file path=ppt/slides/slide8.xml><?xml version="1.0" encoding="utf-8"?>
+<p:sld xmlns:a="http://schemas.openxmlformats.org/drawingml/2006/main" xmlns:r="http://schemas.openxmlformats.org/officeDocument/2006/relationships" xmlns:p="http://schemas.openxmlformats.org/presentationml/2006/main">
+  <p:cSld>
+    <p:spTree>
+      <p:nvGrpSpPr>
+        <p:cNvPr id="1" name=""/>
+        <p:cNvGrpSpPr/>
+        <p:nvPr/>
+      </p:nvGrpSpPr>
+      <p:grpSpPr>
+        <a:xfrm>
+          <a:off x="0" y="0"/>
+          <a:ext cx="0" cy="0"/>
+          <a:chOff x="0" y="0"/>
+          <a:chExt cx="0" cy="0"/>
+        </a:xfrm>
+      </p:grpSpPr>
+      <p:sp>
+        <p:nvSpPr>
+          <p:cNvPr id="4" name="Title 3">
+            <a:extLst>
+              <a:ext uri="{FF2B5EF4-FFF2-40B4-BE49-F238E27FC236}">
+                <a16:creationId xmlns:a16="http://schemas.microsoft.com/office/drawing/2014/main" id="{AE75D4F9-9295-84C3-BC26-7366432BADCA}"/>
+              </a:ext>
+            </a:extLst>
+          </p:cNvPr>
+          <p:cNvSpPr>
+            <a:spLocks noGrp="1"/>
+          </p:cNvSpPr>
+          <p:nvPr>
+            <p:ph type="title"/>
+          </p:nvPr>
+        </p:nvSpPr>
+        <p:spPr/>
+        <p:txBody>
+          <a:bodyPr/>
+          <a:lstStyle/>
+          <a:p>
+            <a:r>
+              <a:rPr lang="en-US" dirty="0"/>
+              <a:t>Collection</a:t>
+            </a:r>
+            <a:endParaRPr lang="en-MY" dirty="0"/>
+          </a:p>
+        </p:txBody>
+      </p:sp>
+      <p:sp>
+        <p:nvSpPr>
+          <p:cNvPr id="5" name="Text Placeholder 4">
+            <a:extLst>
+              <a:ext uri="{FF2B5EF4-FFF2-40B4-BE49-F238E27FC236}">
+                <a16:creationId xmlns:a16="http://schemas.microsoft.com/office/drawing/2014/main" id="{BC61FB80-C64C-9BEA-9F4F-4D99916C5A71}"/>
+              </a:ext>
+            </a:extLst>
+          </p:cNvPr>
+          <p:cNvSpPr>
+            <a:spLocks noGrp="1"/>
+          </p:cNvSpPr>
+          <p:nvPr>
+            <p:ph type="body" idx="1"/>
+          </p:nvPr>
+        </p:nvSpPr>
+        <p:spPr/>
+        <p:txBody>
+          <a:bodyPr/>
+          <a:lstStyle/>
+          <a:p>
+            <a:r>
+              <a:rPr lang="en-US" dirty="0"/>
+              <a:t>tuple</a:t>
+            </a:r>
+            <a:endParaRPr lang="en-MY" dirty="0"/>
+          </a:p>
+        </p:txBody>
+      </p:sp>
+    </p:spTree>
+    <p:extLst>
+      <p:ext uri="{BB962C8B-B14F-4D97-AF65-F5344CB8AC3E}">
+        <p14:creationId xmlns:p14="http://schemas.microsoft.com/office/powerpoint/2010/main" val="3068336530"/>
+      </p:ext>
+    </p:extLst>
+  </p:cSld>
+  <p:clrMapOvr>
+    <a:masterClrMapping/>
+  </p:clrMapOvr>
+</p:sld>
+</file>
+
+<file path=ppt/slides/slide9.xml><?xml version="1.0" encoding="utf-8"?>
+<p:sld xmlns:a="http://schemas.openxmlformats.org/drawingml/2006/main" xmlns:r="http://schemas.openxmlformats.org/officeDocument/2006/relationships" xmlns:p="http://schemas.openxmlformats.org/presentationml/2006/main">
+  <p:cSld>
+    <p:bg>
+      <p:bgPr>
+        <a:blipFill rotWithShape="1">
+          <a:blip r:embed="rId2">
+            <a:duotone>
+              <a:schemeClr val="bg2">
+                <a:shade val="28000"/>
+                <a:satMod val="94000"/>
+                <a:lumMod val="20000"/>
+              </a:schemeClr>
+              <a:schemeClr val="bg2">
+                <a:tint val="94000"/>
+                <a:shade val="84000"/>
+                <a:satMod val="148000"/>
+                <a:lumMod val="114000"/>
+              </a:schemeClr>
+            </a:duotone>
+          </a:blip>
+          <a:stretch/>
+        </a:blipFill>
+        <a:effectLst/>
+      </p:bgPr>
+    </p:bg>
+    <p:spTree>
+      <p:nvGrpSpPr>
+        <p:cNvPr id="1" name=""/>
+        <p:cNvGrpSpPr/>
+        <p:nvPr/>
+      </p:nvGrpSpPr>
+      <p:grpSpPr>
+        <a:xfrm>
+          <a:off x="0" y="0"/>
+          <a:ext cx="0" cy="0"/>
+          <a:chOff x="0" y="0"/>
+          <a:chExt cx="0" cy="0"/>
+        </a:xfrm>
+      </p:grpSpPr>
+      <p:sp>
+        <p:nvSpPr>
+          <p:cNvPr id="4" name="Title 3">
+            <a:extLst>
+              <a:ext uri="{FF2B5EF4-FFF2-40B4-BE49-F238E27FC236}">
+                <a16:creationId xmlns:a16="http://schemas.microsoft.com/office/drawing/2014/main" id="{BFA33DDE-F022-EAB0-D158-05DB8CDCB8B8}"/>
+              </a:ext>
+            </a:extLst>
+          </p:cNvPr>
+          <p:cNvSpPr>
+            <a:spLocks noGrp="1"/>
+          </p:cNvSpPr>
+          <p:nvPr>
+            <p:ph type="title"/>
+          </p:nvPr>
+        </p:nvSpPr>
+        <p:spPr>
+          <a:xfrm>
+            <a:off x="643192" y="609600"/>
+            <a:ext cx="3643674" cy="1905000"/>
+          </a:xfrm>
+        </p:spPr>
+        <p:txBody>
+          <a:bodyPr vert="horz" lIns="91440" tIns="45720" rIns="91440" bIns="45720" rtlCol="0" anchor="ctr">
+            <a:normAutofit/>
+          </a:bodyPr>
+          <a:lstStyle/>
+          <a:p>
+            <a:r>
+              <a:rPr lang="en-US" sz="2800"/>
+              <a:t>Tuple</a:t>
+            </a:r>
+          </a:p>
+        </p:txBody>
+      </p:sp>
+      <p:sp>
+        <p:nvSpPr>
+          <p:cNvPr id="5" name="Content Placeholder 4">
+            <a:extLst>
+              <a:ext uri="{FF2B5EF4-FFF2-40B4-BE49-F238E27FC236}">
+                <a16:creationId xmlns:a16="http://schemas.microsoft.com/office/drawing/2014/main" id="{AF870020-EF77-6DF6-FDE1-0879A3C04EA2}"/>
+              </a:ext>
+            </a:extLst>
+          </p:cNvPr>
+          <p:cNvSpPr>
+            <a:spLocks noGrp="1"/>
+          </p:cNvSpPr>
+          <p:nvPr>
+            <p:ph sz="half" idx="1"/>
+          </p:nvPr>
+        </p:nvSpPr>
+        <p:spPr>
+          <a:xfrm>
+            <a:off x="643192" y="2666999"/>
+            <a:ext cx="3643674" cy="3216276"/>
+          </a:xfrm>
+        </p:spPr>
+        <p:txBody>
+          <a:bodyPr vert="horz" lIns="91440" tIns="45720" rIns="91440" bIns="45720" rtlCol="0" anchor="t">
+            <a:normAutofit/>
+          </a:bodyPr>
+          <a:lstStyle/>
+          <a:p>
+            <a:r>
+              <a:rPr lang="en-US" dirty="0"/>
+              <a:t>Collections</a:t>
+            </a:r>
+          </a:p>
+          <a:p>
+            <a:r>
+              <a:rPr lang="en-US"/>
+              <a:t>Dapat</a:t>
+            </a:r>
+            <a:r>
+              <a:rPr lang="en-US" dirty="0"/>
+              <a:t> </a:t>
+            </a:r>
+            <a:r>
+              <a:rPr lang="en-US"/>
+              <a:t>memuat</a:t>
+            </a:r>
+            <a:r>
+              <a:rPr lang="en-US" dirty="0"/>
+              <a:t> </a:t>
+            </a:r>
+            <a:r>
+              <a:rPr lang="en-US"/>
+              <a:t>tipe</a:t>
+            </a:r>
+            <a:r>
+              <a:rPr lang="en-US" dirty="0"/>
+              <a:t> data lain: string, </a:t>
+            </a:r>
+            <a:r>
+              <a:rPr lang="en-US"/>
+              <a:t>bilangan</a:t>
+            </a:r>
+            <a:r>
+              <a:rPr lang="en-US" dirty="0"/>
+              <a:t>, </a:t>
+            </a:r>
+            <a:r>
+              <a:rPr lang="en-US"/>
+              <a:t>bahkan</a:t>
+            </a:r>
+            <a:r>
+              <a:rPr lang="en-US" dirty="0"/>
+              <a:t> tuple lain</a:t>
+            </a:r>
+          </a:p>
+          <a:p>
+            <a:r>
+              <a:rPr lang="en-US" dirty="0"/>
+              <a:t>Immutable</a:t>
+            </a:r>
+          </a:p>
+        </p:txBody>
+      </p:sp>
+      <p:pic>
+        <p:nvPicPr>
+          <p:cNvPr id="10" name="Picture 9">
+            <a:extLst>
+              <a:ext uri="{FF2B5EF4-FFF2-40B4-BE49-F238E27FC236}">
+                <a16:creationId xmlns:a16="http://schemas.microsoft.com/office/drawing/2014/main" id="{A5F9C671-A575-8BFA-963D-F5D54FB8309B}"/>
+              </a:ext>
+            </a:extLst>
+          </p:cNvPr>
+          <p:cNvPicPr>
+            <a:picLocks noChangeAspect="1"/>
+          </p:cNvPicPr>
+          <p:nvPr/>
+        </p:nvPicPr>
+        <p:blipFill>
+          <a:blip r:embed="rId3"/>
+          <a:stretch>
+            <a:fillRect/>
+          </a:stretch>
+        </p:blipFill>
+        <p:spPr>
+          <a:xfrm>
+            <a:off x="4630994" y="1050527"/>
+            <a:ext cx="6916633" cy="4436904"/>
+          </a:xfrm>
+          <a:prstGeom prst="roundRect">
+            <a:avLst>
+              <a:gd name="adj" fmla="val 3517"/>
+            </a:avLst>
+          </a:prstGeom>
+          <a:ln w="38100">
+            <a:gradFill flip="none" rotWithShape="1">
+              <a:gsLst>
+                <a:gs pos="0">
+                  <a:srgbClr val="363D46"/>
+                </a:gs>
+                <a:gs pos="100000">
+                  <a:srgbClr val="363D46">
+                    <a:lumMod val="75000"/>
+                  </a:srgbClr>
+                </a:gs>
+              </a:gsLst>
+              <a:lin ang="5400000" scaled="0"/>
+              <a:tileRect/>
+            </a:gradFill>
+          </a:ln>
+          <a:effectLst>
+            <a:innerShdw blurRad="57150" dist="38100" dir="14460000">
+              <a:srgbClr val="000000">
+                <a:alpha val="70000"/>
+              </a:srgbClr>
+            </a:innerShdw>
+          </a:effectLst>
+        </p:spPr>
+      </p:pic>
+      <p:pic>
+        <p:nvPicPr>
+          <p:cNvPr id="7" name="Content Placeholder 6">
+            <a:extLst>
+              <a:ext uri="{FF2B5EF4-FFF2-40B4-BE49-F238E27FC236}">
+                <a16:creationId xmlns:a16="http://schemas.microsoft.com/office/drawing/2014/main" id="{EDFE5F3F-15E3-BCC0-C327-AC4C1A19C340}"/>
+              </a:ext>
+            </a:extLst>
+          </p:cNvPr>
+          <p:cNvPicPr>
+            <a:picLocks noGrp="1" noChangeAspect="1"/>
+          </p:cNvPicPr>
+          <p:nvPr>
+            <p:ph sz="half" idx="2"/>
+          </p:nvPr>
+        </p:nvPicPr>
+        <p:blipFill>
+          <a:blip r:embed="rId4"/>
+          <a:stretch>
+            <a:fillRect/>
+          </a:stretch>
+        </p:blipFill>
+        <p:spPr>
+          <a:xfrm>
+            <a:off x="8608990" y="4229085"/>
+            <a:ext cx="46" cy="30"/>
+          </a:xfrm>
+        </p:spPr>
+      </p:pic>
+    </p:spTree>
+    <p:extLst>
+      <p:ext uri="{BB962C8B-B14F-4D97-AF65-F5344CB8AC3E}">
+        <p14:creationId xmlns:p14="http://schemas.microsoft.com/office/powerpoint/2010/main" val="2005859422"/>
       </p:ext>
     </p:extLst>
   </p:cSld>

</xml_diff>